<commit_message>
In NQueen.Common.Solver.etSimulationResultsAsync changed the signature to: GetSimulationResultsAsync(sbyte boardSize,             SolutionMode solutionMode = SolutionMode.Unique, DisplayMode displayMode = DisplayMode.Hide);
Changed also signature of some methods in NQueen.Model:
   - In simulation of solutions used properties whenever possible and removed parameters from the methods

   - public Solver(sbyte boardSize, DisplayMode DisplayMode = DisplayMode.Hide)
              => Initialize(boardSize, SolutionMode, DisplayMode);
    - Initialize(sbyte boardSize, SolutionMode solutionMode, DisplayMode displayMode)
    - private bool UpdateSolutions(IEnumerable<sbyte> solution)
    - private IEnumerable<Solution> MainSolve()
    - private bool SolveRec(sbyte colNo = 0)
    - private sbyte LocateQueen(sbyte colNo)
    - private bool UpdateSolutions(IEnumerable<sbyte> solution)
</commit_message>
<xml_diff>
--- a/Documentation/NQueen Presentation.pptx
+++ b/Documentation/NQueen Presentation.pptx
@@ -243,7 +243,7 @@
           </a:lstStyle>
           <a:p>
             <a:fld id="{22356391-CFA0-1544-8425-9183CAE42ACA}" type="datetimeFigureOut">
-              <a:t>26.09.2018</a:t>
+              <a:t>12/22/2020</a:t>
             </a:fld>
             <a:endParaRPr lang="en-US" dirty="0"/>
           </a:p>
@@ -413,7 +413,7 @@
             <a:fld id="{DB01AB9E-8BFB-DA44-9869-DDFC164FA55D}" type="datetimeFigureOut">
               <a:rPr lang="en-US"/>
               <a:pPr/>
-              <a:t>9/26/2018</a:t>
+              <a:t>12/22/2020</a:t>
             </a:fld>
             <a:endParaRPr lang="en-US" dirty="0"/>
           </a:p>
@@ -8498,7 +8498,7 @@
           <a:graphicData uri="http://schemas.openxmlformats.org/presentationml/2006/ole">
             <mc:AlternateContent xmlns:mc="http://schemas.openxmlformats.org/markup-compatibility/2006">
               <mc:Choice xmlns:v="urn:schemas-microsoft-com:vml" Requires="v">
-                <p:oleObj spid="_x0000_s12334" name="Packager Shell Object" showAsIcon="1" r:id="rId5" imgW="2836800" imgH="604800" progId="Package">
+                <p:oleObj name="Packager Shell Object" showAsIcon="1" r:id="rId5" imgW="2836800" imgH="604800" progId="Package">
                   <p:embed/>
                 </p:oleObj>
               </mc:Choice>
@@ -8706,7 +8706,7 @@
           <a:graphicData uri="http://schemas.openxmlformats.org/presentationml/2006/ole">
             <mc:AlternateContent xmlns:mc="http://schemas.openxmlformats.org/markup-compatibility/2006">
               <mc:Choice xmlns:v="urn:schemas-microsoft-com:vml" Requires="v">
-                <p:oleObj spid="_x0000_s13358" name="Packager Shell Object" showAsIcon="1" r:id="rId5" imgW="2836800" imgH="604800" progId="Package">
+                <p:oleObj name="Packager Shell Object" showAsIcon="1" r:id="rId5" imgW="2836800" imgH="604800" progId="Package">
                   <p:embed/>
                 </p:oleObj>
               </mc:Choice>
@@ -8914,7 +8914,7 @@
           <a:graphicData uri="http://schemas.openxmlformats.org/presentationml/2006/ole">
             <mc:AlternateContent xmlns:mc="http://schemas.openxmlformats.org/markup-compatibility/2006">
               <mc:Choice xmlns:v="urn:schemas-microsoft-com:vml" Requires="v">
-                <p:oleObj spid="_x0000_s14381" name="Packager Shell Object" showAsIcon="1" r:id="rId5" imgW="2836800" imgH="604800" progId="Package">
+                <p:oleObj name="Packager Shell Object" showAsIcon="1" r:id="rId5" imgW="2836800" imgH="604800" progId="Package">
                   <p:embed/>
                 </p:oleObj>
               </mc:Choice>
@@ -9122,7 +9122,7 @@
           <a:graphicData uri="http://schemas.openxmlformats.org/presentationml/2006/ole">
             <mc:AlternateContent xmlns:mc="http://schemas.openxmlformats.org/markup-compatibility/2006">
               <mc:Choice xmlns:v="urn:schemas-microsoft-com:vml" Requires="v">
-                <p:oleObj spid="_x0000_s15405" name="Packager Shell Object" showAsIcon="1" r:id="rId5" imgW="2758320" imgH="604800" progId="Package">
+                <p:oleObj name="Packager Shell Object" showAsIcon="1" r:id="rId5" imgW="2758320" imgH="604800" progId="Package">
                   <p:embed/>
                 </p:oleObj>
               </mc:Choice>
@@ -9474,7 +9474,7 @@
           <a:p>
             <a:r>
               <a:rPr lang="en-US" dirty="0"/>
-              <a:t>What Next</a:t>
+              <a:t>What’s Next</a:t>
             </a:r>
           </a:p>
         </p:txBody>
@@ -10660,8 +10660,8 @@
           </a:p>
         </p:txBody>
       </p:sp>
-      <mc:AlternateContent xmlns:mc="http://schemas.openxmlformats.org/markup-compatibility/2006">
-        <mc:Choice xmlns:a14="http://schemas.microsoft.com/office/drawing/2010/main" Requires="a14">
+      <mc:AlternateContent xmlns:mc="http://schemas.openxmlformats.org/markup-compatibility/2006" xmlns:a14="http://schemas.microsoft.com/office/drawing/2010/main">
+        <mc:Choice Requires="a14">
           <p:sp>
             <p:nvSpPr>
               <p:cNvPr id="7" name="Subtitle 2">
@@ -10783,7 +10783,7 @@
             </p:txBody>
           </p:sp>
         </mc:Choice>
-        <mc:Fallback>
+        <mc:Fallback xmlns="">
           <p:sp>
             <p:nvSpPr>
               <p:cNvPr id="7" name="Subtitle 2">
@@ -11114,8 +11114,8 @@
           <a:chExt cx="0" cy="0"/>
         </a:xfrm>
       </p:grpSpPr>
-      <mc:AlternateContent xmlns:mc="http://schemas.openxmlformats.org/markup-compatibility/2006" xmlns:a14="http://schemas.microsoft.com/office/drawing/2010/main">
-        <mc:Choice Requires="a14">
+      <mc:AlternateContent xmlns:mc="http://schemas.openxmlformats.org/markup-compatibility/2006">
+        <mc:Choice xmlns:a14="http://schemas.microsoft.com/office/drawing/2010/main" Requires="a14">
           <p:sp>
             <p:nvSpPr>
               <p:cNvPr id="7" name="Subtitle 2">
@@ -11186,7 +11186,23 @@
                       <a:schemeClr val="bg1"/>
                     </a:solidFill>
                   </a:rPr>
-                  <a:t>a solution is chosen in the list box, then it may see be seen both on the chessboard and in a textbox</a:t>
+                  <a:t>a solution is chosen in the list box, then it </a:t>
+                </a:r>
+                <a:r>
+                  <a:rPr lang="en-US" noProof="0">
+                    <a:solidFill>
+                      <a:schemeClr val="bg1"/>
+                    </a:solidFill>
+                  </a:rPr>
+                  <a:t>may be </a:t>
+                </a:r>
+                <a:r>
+                  <a:rPr lang="en-US" noProof="0" dirty="0">
+                    <a:solidFill>
+                      <a:schemeClr val="bg1"/>
+                    </a:solidFill>
+                  </a:rPr>
+                  <a:t>seen both on the chessboard and in a textbox</a:t>
                 </a:r>
               </a:p>
               <a:p>
@@ -11425,7 +11441,7 @@
             </p:txBody>
           </p:sp>
         </mc:Choice>
-        <mc:Fallback xmlns="">
+        <mc:Fallback>
           <p:sp>
             <p:nvSpPr>
               <p:cNvPr id="7" name="Subtitle 2">
@@ -11459,7 +11475,7 @@
               <a:lstStyle/>
               <a:p>
                 <a:r>
-                  <a:rPr lang="nb-NO">
+                  <a:rPr lang="en-US">
                     <a:noFill/>
                   </a:rPr>
                   <a:t> </a:t>
@@ -11698,7 +11714,7 @@
           <a:graphicData uri="http://schemas.openxmlformats.org/presentationml/2006/ole">
             <mc:AlternateContent xmlns:mc="http://schemas.openxmlformats.org/markup-compatibility/2006">
               <mc:Choice xmlns:v="urn:schemas-microsoft-com:vml" Requires="v">
-                <p:oleObj spid="_x0000_s9269" name="Packager Shell Object" showAsIcon="1" r:id="rId5" imgW="3375000" imgH="604800" progId="Package">
+                <p:oleObj name="Packager Shell Object" showAsIcon="1" r:id="rId5" imgW="3375000" imgH="604800" progId="Package">
                   <p:embed/>
                 </p:oleObj>
               </mc:Choice>
@@ -11903,7 +11919,7 @@
           <a:graphicData uri="http://schemas.openxmlformats.org/presentationml/2006/ole">
             <mc:AlternateContent xmlns:mc="http://schemas.openxmlformats.org/markup-compatibility/2006">
               <mc:Choice xmlns:v="urn:schemas-microsoft-com:vml" Requires="v">
-                <p:oleObj spid="_x0000_s10287" name="Packager Shell Object" showAsIcon="1" r:id="rId5" imgW="3375000" imgH="604800" progId="Package">
+                <p:oleObj name="Packager Shell Object" showAsIcon="1" r:id="rId5" imgW="3375000" imgH="604800" progId="Package">
                   <p:embed/>
                 </p:oleObj>
               </mc:Choice>
@@ -12116,7 +12132,7 @@
           <a:graphicData uri="http://schemas.openxmlformats.org/presentationml/2006/ole">
             <mc:AlternateContent xmlns:mc="http://schemas.openxmlformats.org/markup-compatibility/2006">
               <mc:Choice xmlns:v="urn:schemas-microsoft-com:vml" Requires="v">
-                <p:oleObj spid="_x0000_s11310" name="Packager Shell Object" showAsIcon="1" r:id="rId5" imgW="3038760" imgH="604800" progId="Package">
+                <p:oleObj name="Packager Shell Object" showAsIcon="1" r:id="rId5" imgW="3038760" imgH="604800" progId="Package">
                   <p:embed/>
                 </p:oleObj>
               </mc:Choice>

</xml_diff>

<commit_message>
In Documentation    - PowerPoint Presentation    - Excel File
</commit_message>
<xml_diff>
--- a/Documentation/NQueen Presentation.pptx
+++ b/Documentation/NQueen Presentation.pptx
@@ -243,7 +243,7 @@
           </a:lstStyle>
           <a:p>
             <a:fld id="{22356391-CFA0-1544-8425-9183CAE42ACA}" type="datetimeFigureOut">
-              <a:t>12/22/2020</a:t>
+              <a:t>2/13/2021</a:t>
             </a:fld>
             <a:endParaRPr lang="en-US" dirty="0"/>
           </a:p>
@@ -413,7 +413,7 @@
             <a:fld id="{DB01AB9E-8BFB-DA44-9869-DDFC164FA55D}" type="datetimeFigureOut">
               <a:rPr lang="en-US"/>
               <a:pPr/>
-              <a:t>12/22/2020</a:t>
+              <a:t>2/13/2021</a:t>
             </a:fld>
             <a:endParaRPr lang="en-US" dirty="0"/>
           </a:p>
@@ -6395,7 +6395,7 @@
           <a:p>
             <a:r>
               <a:rPr lang="en-US" dirty="0"/>
-              <a:t>Algorithm Overview,</a:t>
+              <a:t>Overview of Algorithm,</a:t>
             </a:r>
           </a:p>
           <a:p>
@@ -6534,8 +6534,8 @@
           </a:p>
         </p:txBody>
       </p:sp>
-      <mc:AlternateContent xmlns:mc="http://schemas.openxmlformats.org/markup-compatibility/2006" xmlns:a14="http://schemas.microsoft.com/office/drawing/2010/main">
-        <mc:Choice Requires="a14">
+      <mc:AlternateContent xmlns:mc="http://schemas.openxmlformats.org/markup-compatibility/2006">
+        <mc:Choice xmlns:a14="http://schemas.microsoft.com/office/drawing/2010/main" Requires="a14">
           <p:sp>
             <p:nvSpPr>
               <p:cNvPr id="12" name="Subtitle 2">
@@ -6553,7 +6553,7 @@
             <p:spPr>
               <a:xfrm>
                 <a:off x="1082523" y="1270093"/>
-                <a:ext cx="7900111" cy="3133165"/>
+                <a:ext cx="7900111" cy="3145476"/>
               </a:xfrm>
               <a:prstGeom prst="rect">
                 <a:avLst/>
@@ -6707,6 +6707,49 @@
                 </a:pPr>
                 <a:r>
                   <a:rPr lang="en-US" dirty="0"/>
+                  <a:t>Placement of a queen is given with two numbers: </a:t>
+                </a:r>
+                <a:r>
+                  <a:rPr lang="en-US" sz="2000" dirty="0"/>
+                  <a:t>(column no., row no.)</a:t>
+                </a:r>
+                <a:endParaRPr lang="en-US" dirty="0"/>
+              </a:p>
+              <a:p>
+                <a:pPr>
+                  <a:buFont typeface="Wingdings" panose="05000000000000000000" pitchFamily="2" charset="2"/>
+                  <a:buChar char="Ø"/>
+                </a:pPr>
+                <a:r>
+                  <a:rPr lang="en-US" dirty="0"/>
+                  <a:t>Solution modus may be chosen between:</a:t>
+                </a:r>
+              </a:p>
+              <a:p>
+                <a:pPr lvl="1">
+                  <a:buFont typeface="Wingdings" panose="05000000000000000000" pitchFamily="2" charset="2"/>
+                  <a:buChar char="ü"/>
+                </a:pPr>
+                <a:r>
+                  <a:rPr lang="en-US" i="1" dirty="0"/>
+                  <a:t>Single</a:t>
+                </a:r>
+                <a:r>
+                  <a:rPr lang="en-US" dirty="0"/>
+                  <a:t>, </a:t>
+                </a:r>
+                <a:r>
+                  <a:rPr lang="en-US" i="1" dirty="0"/>
+                  <a:t>Unique and All</a:t>
+                </a:r>
+              </a:p>
+              <a:p>
+                <a:pPr>
+                  <a:buFont typeface="Wingdings" panose="05000000000000000000" pitchFamily="2" charset="2"/>
+                  <a:buChar char="ü"/>
+                </a:pPr>
+                <a:r>
+                  <a:rPr lang="en-US" dirty="0"/>
                   <a:t>A single solution is a </a:t>
                 </a:r>
                 <a14:m>
@@ -6729,73 +6772,45 @@
                 </a:r>
               </a:p>
               <a:p>
-                <a:pPr>
+                <a:pPr algn="just">
                   <a:buFont typeface="Wingdings" panose="05000000000000000000" pitchFamily="2" charset="2"/>
                   <a:buChar char="Ø"/>
                 </a:pPr>
                 <a:r>
                   <a:rPr lang="en-US" dirty="0"/>
-                  <a:t>Placement of a queen is given with two numbers: </a:t>
-                </a:r>
-                <a:r>
-                  <a:rPr lang="en-US" sz="2000" dirty="0"/>
-                  <a:t>(column no., row no.)</a:t>
+                  <a:t>Unique solutions:</a:t>
                 </a:r>
               </a:p>
               <a:p>
-                <a:pPr>
-                  <a:buFont typeface="Wingdings" panose="05000000000000000000" pitchFamily="2" charset="2"/>
-                  <a:buChar char="Ø"/>
-                </a:pPr>
-                <a:r>
-                  <a:rPr lang="en-US" dirty="0"/>
-                  <a:t>Every solution may have up to 7 symm. counterparts :</a:t>
-                </a:r>
-              </a:p>
-              <a:p>
-                <a:pPr lvl="1">
+                <a:pPr lvl="1" algn="just">
                   <a:buFont typeface="Wingdings" panose="05000000000000000000" pitchFamily="2" charset="2"/>
                   <a:buChar char="ü"/>
                 </a:pPr>
                 <a:r>
                   <a:rPr lang="en-US" dirty="0"/>
-                  <a:t>The solutions are packed in groups with size of up to eight:</a:t>
+                  <a:t>a solution is characterized as </a:t>
                 </a:r>
-              </a:p>
-              <a:p>
-                <a:pPr lvl="2">
-                  <a:buFont typeface="Wingdings" panose="05000000000000000000" pitchFamily="2" charset="2"/>
-                  <a:buChar char="ü"/>
-                </a:pPr>
+                <a:r>
+                  <a:rPr lang="en-US" i="1" dirty="0"/>
+                  <a:t>unique</a:t>
+                </a:r>
                 <a:r>
                   <a:rPr lang="en-US" dirty="0"/>
-                  <a:t>Symm. with respect to horizontal and vertical midline (2)</a:t>
+                  <a:t>,</a:t>
                 </a:r>
-              </a:p>
-              <a:p>
-                <a:pPr lvl="2">
-                  <a:buFont typeface="Wingdings" panose="05000000000000000000" pitchFamily="2" charset="2"/>
-                  <a:buChar char="ü"/>
-                </a:pPr>
+                <a:r>
+                  <a:rPr lang="en-US" i="1" dirty="0"/>
+                  <a:t> </a:t>
+                </a:r>
                 <a:r>
                   <a:rPr lang="en-US" dirty="0"/>
-                  <a:t>Symm. with respect to main diagonals (2)</a:t>
-                </a:r>
-              </a:p>
-              <a:p>
-                <a:pPr lvl="2">
-                  <a:buFont typeface="Wingdings" panose="05000000000000000000" pitchFamily="2" charset="2"/>
-                  <a:buChar char="ü"/>
-                </a:pPr>
-                <a:r>
-                  <a:rPr lang="en-US" dirty="0"/>
-                  <a:t>Turning clockwise an amount of 90, 180 and 270 degrees (3)</a:t>
+                  <a:t>if it is not equal to any other solution or their symm. counterparts</a:t>
                 </a:r>
               </a:p>
             </p:txBody>
           </p:sp>
         </mc:Choice>
-        <mc:Fallback xmlns="">
+        <mc:Fallback>
           <p:sp>
             <p:nvSpPr>
               <p:cNvPr id="12" name="Subtitle 2">
@@ -6813,7 +6828,7 @@
             <p:spPr>
               <a:xfrm>
                 <a:off x="1082523" y="1270093"/>
-                <a:ext cx="7900111" cy="3133165"/>
+                <a:ext cx="7900111" cy="3145476"/>
               </a:xfrm>
               <a:prstGeom prst="rect">
                 <a:avLst/>
@@ -6821,7 +6836,7 @@
               <a:blipFill>
                 <a:blip r:embed="rId3"/>
                 <a:stretch>
-                  <a:fillRect l="-1080" t="-1362"/>
+                  <a:fillRect l="-1080" t="-1357" r="-772" b="-2713"/>
                 </a:stretch>
               </a:blipFill>
             </p:spPr>
@@ -6830,7 +6845,7 @@
               <a:lstStyle/>
               <a:p>
                 <a:r>
-                  <a:rPr lang="nb-NO">
+                  <a:rPr lang="en-US">
                     <a:noFill/>
                   </a:rPr>
                   <a:t> </a:t>
@@ -6952,7 +6967,7 @@
         <p:spPr>
           <a:xfrm>
             <a:off x="1082524" y="1270093"/>
-            <a:ext cx="7669590" cy="3207032"/>
+            <a:ext cx="7669590" cy="3083921"/>
           </a:xfrm>
           <a:prstGeom prst="rect">
             <a:avLst/>
@@ -7100,78 +7115,6 @@
             </a:lvl9pPr>
           </a:lstStyle>
           <a:p>
-            <a:pPr>
-              <a:buFont typeface="Wingdings" panose="05000000000000000000" pitchFamily="2" charset="2"/>
-              <a:buChar char="Ø"/>
-            </a:pPr>
-            <a:r>
-              <a:rPr lang="en-US" dirty="0"/>
-              <a:t>Solution modus may be chosen between:</a:t>
-            </a:r>
-          </a:p>
-          <a:p>
-            <a:pPr lvl="1">
-              <a:buFont typeface="Wingdings" panose="05000000000000000000" pitchFamily="2" charset="2"/>
-              <a:buChar char="ü"/>
-            </a:pPr>
-            <a:r>
-              <a:rPr lang="en-US" i="1" dirty="0"/>
-              <a:t>Single</a:t>
-            </a:r>
-            <a:r>
-              <a:rPr lang="en-US" dirty="0"/>
-              <a:t>, </a:t>
-            </a:r>
-            <a:r>
-              <a:rPr lang="en-US" i="1" dirty="0"/>
-              <a:t>Unique and All</a:t>
-            </a:r>
-            <a:endParaRPr lang="en-US" dirty="0"/>
-          </a:p>
-          <a:p>
-            <a:pPr algn="just">
-              <a:buFont typeface="Wingdings" panose="05000000000000000000" pitchFamily="2" charset="2"/>
-              <a:buChar char="Ø"/>
-            </a:pPr>
-            <a:endParaRPr lang="en-US" dirty="0"/>
-          </a:p>
-          <a:p>
-            <a:pPr algn="just">
-              <a:buFont typeface="Wingdings" panose="05000000000000000000" pitchFamily="2" charset="2"/>
-              <a:buChar char="Ø"/>
-            </a:pPr>
-            <a:r>
-              <a:rPr lang="en-US" dirty="0"/>
-              <a:t>Unique solutions:</a:t>
-            </a:r>
-          </a:p>
-          <a:p>
-            <a:pPr lvl="1" algn="just">
-              <a:buFont typeface="Wingdings" panose="05000000000000000000" pitchFamily="2" charset="2"/>
-              <a:buChar char="ü"/>
-            </a:pPr>
-            <a:r>
-              <a:rPr lang="en-US" dirty="0"/>
-              <a:t>a solution is characterized as </a:t>
-            </a:r>
-            <a:r>
-              <a:rPr lang="en-US" i="1" dirty="0"/>
-              <a:t>unique</a:t>
-            </a:r>
-            <a:r>
-              <a:rPr lang="en-US" dirty="0"/>
-              <a:t>,</a:t>
-            </a:r>
-            <a:r>
-              <a:rPr lang="en-US" i="1" dirty="0"/>
-              <a:t> </a:t>
-            </a:r>
-            <a:r>
-              <a:rPr lang="en-US" dirty="0"/>
-              <a:t>if it is not equal to any other solution or their symm. counterparts</a:t>
-            </a:r>
-          </a:p>
-          <a:p>
             <a:pPr algn="just">
               <a:buFont typeface="Wingdings" panose="05000000000000000000" pitchFamily="2" charset="2"/>
               <a:buChar char="Ø"/>
@@ -7188,7 +7131,64 @@
             </a:pPr>
             <a:r>
               <a:rPr lang="en-US" dirty="0"/>
-              <a:t>are unique solutions and all their symm. counterparts</a:t>
+              <a:t>are unique solutions and all their symm. Counterparts</a:t>
+            </a:r>
+          </a:p>
+          <a:p>
+            <a:pPr>
+              <a:buFont typeface="Wingdings" panose="05000000000000000000" pitchFamily="2" charset="2"/>
+              <a:buChar char="Ø"/>
+            </a:pPr>
+            <a:endParaRPr lang="en-US" dirty="0"/>
+          </a:p>
+          <a:p>
+            <a:pPr>
+              <a:buFont typeface="Wingdings" panose="05000000000000000000" pitchFamily="2" charset="2"/>
+              <a:buChar char="Ø"/>
+            </a:pPr>
+            <a:r>
+              <a:rPr lang="en-US" dirty="0"/>
+              <a:t>Every solution may have up to 7 symm. counterparts:</a:t>
+            </a:r>
+          </a:p>
+          <a:p>
+            <a:pPr lvl="1">
+              <a:buFont typeface="Wingdings" panose="05000000000000000000" pitchFamily="2" charset="2"/>
+              <a:buChar char="ü"/>
+            </a:pPr>
+            <a:r>
+              <a:rPr lang="en-US" dirty="0"/>
+              <a:t>The solutions are packed in groups with size of up to eight:</a:t>
+            </a:r>
+          </a:p>
+          <a:p>
+            <a:pPr lvl="2">
+              <a:buFont typeface="Wingdings" panose="05000000000000000000" pitchFamily="2" charset="2"/>
+              <a:buChar char="ü"/>
+            </a:pPr>
+            <a:r>
+              <a:rPr lang="en-US" dirty="0"/>
+              <a:t>Symm. with respect to horizontal and vertical midline (2)</a:t>
+            </a:r>
+          </a:p>
+          <a:p>
+            <a:pPr lvl="2">
+              <a:buFont typeface="Wingdings" panose="05000000000000000000" pitchFamily="2" charset="2"/>
+              <a:buChar char="ü"/>
+            </a:pPr>
+            <a:r>
+              <a:rPr lang="en-US" dirty="0"/>
+              <a:t>Symm. with respect to main diagonals (2)</a:t>
+            </a:r>
+          </a:p>
+          <a:p>
+            <a:pPr lvl="2">
+              <a:buFont typeface="Wingdings" panose="05000000000000000000" pitchFamily="2" charset="2"/>
+              <a:buChar char="ü"/>
+            </a:pPr>
+            <a:r>
+              <a:rPr lang="en-US" dirty="0"/>
+              <a:t>Turning clockwise an amount of 90, 180 and 270 degrees (3)</a:t>
             </a:r>
           </a:p>
         </p:txBody>
@@ -7288,8 +7288,8 @@
           </a:p>
         </p:txBody>
       </p:sp>
-      <mc:AlternateContent xmlns:mc="http://schemas.openxmlformats.org/markup-compatibility/2006" xmlns:a14="http://schemas.microsoft.com/office/drawing/2010/main">
-        <mc:Choice Requires="a14">
+      <mc:AlternateContent xmlns:mc="http://schemas.openxmlformats.org/markup-compatibility/2006">
+        <mc:Choice xmlns:a14="http://schemas.microsoft.com/office/drawing/2010/main" Requires="a14">
           <p:sp>
             <p:nvSpPr>
               <p:cNvPr id="12" name="Subtitle 2">
@@ -7565,13 +7565,18 @@
                 </a:pPr>
                 <a:r>
                   <a:rPr lang="en-US" dirty="0"/>
-                  <a:t>It is possible to visualize the solution buildup with an adjustable delay, se Excel-file and the simulations</a:t>
+                  <a:t>It is possible to visualize the solution buildup with an adjustable delay, ref simulations </a:t>
                 </a:r>
+                <a:r>
+                  <a:rPr lang="en-US"/>
+                  <a:t>and the Excel-file</a:t>
+                </a:r>
+                <a:endParaRPr lang="en-US" dirty="0"/>
               </a:p>
             </p:txBody>
           </p:sp>
         </mc:Choice>
-        <mc:Fallback xmlns="">
+        <mc:Fallback>
           <p:sp>
             <p:nvSpPr>
               <p:cNvPr id="12" name="Subtitle 2">
@@ -7606,7 +7611,7 @@
               <a:lstStyle/>
               <a:p>
                 <a:r>
-                  <a:rPr lang="nb-NO">
+                  <a:rPr lang="en-US">
                     <a:noFill/>
                   </a:rPr>
                   <a:t> </a:t>
@@ -10903,7 +10908,7 @@
         <p:spPr>
           <a:xfrm>
             <a:off x="783831" y="1076857"/>
-            <a:ext cx="8064334" cy="3379387"/>
+            <a:ext cx="8064334" cy="3213187"/>
           </a:xfrm>
         </p:spPr>
         <p:txBody>
@@ -10918,7 +10923,7 @@
             </a:pPr>
             <a:r>
               <a:rPr lang="en-US" noProof="0" dirty="0"/>
-              <a:t>Validation and GUI:</a:t>
+              <a:t>GUI:</a:t>
             </a:r>
           </a:p>
           <a:p>
@@ -10946,15 +10951,38 @@
                   <a:schemeClr val="bg1"/>
                 </a:solidFill>
               </a:rPr>
+              <a:t>Solution build up may be visualized </a:t>
+            </a:r>
+            <a:r>
+              <a:rPr lang="en-US" dirty="0">
+                <a:solidFill>
+                  <a:schemeClr val="bg1"/>
+                </a:solidFill>
+              </a:rPr>
+              <a:t>on </a:t>
+            </a:r>
+            <a:r>
+              <a:rPr lang="en-US" noProof="0" dirty="0">
+                <a:solidFill>
+                  <a:schemeClr val="bg1"/>
+                </a:solidFill>
+              </a:rPr>
+              <a:t>the board</a:t>
+            </a:r>
+          </a:p>
+          <a:p>
+            <a:pPr marL="800100" lvl="1" indent="-342900" algn="l">
+              <a:buFont typeface="Wingdings" panose="05000000000000000000" pitchFamily="2" charset="2"/>
+              <a:buChar char="ü"/>
+            </a:pPr>
+            <a:r>
+              <a:rPr lang="en-US" noProof="0" dirty="0">
+                <a:solidFill>
+                  <a:schemeClr val="bg1"/>
+                </a:solidFill>
+              </a:rPr>
               <a:t>The GUI should be responsive under the simulation</a:t>
             </a:r>
-            <a:endParaRPr lang="en-US" noProof="0" dirty="0"/>
-          </a:p>
-          <a:p>
-            <a:pPr marL="342900" indent="-342900" algn="l">
-              <a:buFont typeface="Wingdings" panose="05000000000000000000" pitchFamily="2" charset="2"/>
-              <a:buChar char="Ø"/>
-            </a:pPr>
             <a:endParaRPr lang="en-US" noProof="0" dirty="0"/>
           </a:p>
           <a:p>
@@ -11135,7 +11163,7 @@
             <p:spPr>
               <a:xfrm>
                 <a:off x="783831" y="1076857"/>
-                <a:ext cx="8064334" cy="3730701"/>
+                <a:ext cx="8064334" cy="3319691"/>
               </a:xfrm>
             </p:spPr>
             <p:txBody>
@@ -11186,53 +11214,7 @@
                       <a:schemeClr val="bg1"/>
                     </a:solidFill>
                   </a:rPr>
-                  <a:t>a solution is chosen in the list box, then it </a:t>
-                </a:r>
-                <a:r>
-                  <a:rPr lang="en-US" noProof="0">
-                    <a:solidFill>
-                      <a:schemeClr val="bg1"/>
-                    </a:solidFill>
-                  </a:rPr>
-                  <a:t>may be </a:t>
-                </a:r>
-                <a:r>
-                  <a:rPr lang="en-US" noProof="0" dirty="0">
-                    <a:solidFill>
-                      <a:schemeClr val="bg1"/>
-                    </a:solidFill>
-                  </a:rPr>
-                  <a:t>seen both on the chessboard and in a textbox</a:t>
-                </a:r>
-              </a:p>
-              <a:p>
-                <a:pPr marL="800100" lvl="1" indent="-342900" algn="l">
-                  <a:buFont typeface="Wingdings" panose="05000000000000000000" pitchFamily="2" charset="2"/>
-                  <a:buChar char="ü"/>
-                </a:pPr>
-                <a:r>
-                  <a:rPr lang="en-US" noProof="0" dirty="0">
-                    <a:solidFill>
-                      <a:schemeClr val="bg1"/>
-                    </a:solidFill>
-                  </a:rPr>
-                  <a:t>Solution build up could be visualized </a:t>
-                </a:r>
-                <a:r>
-                  <a:rPr lang="en-US" dirty="0">
-                    <a:solidFill>
-                      <a:schemeClr val="bg1"/>
-                    </a:solidFill>
-                  </a:rPr>
-                  <a:t>on </a:t>
-                </a:r>
-                <a:r>
-                  <a:rPr lang="en-US" noProof="0" dirty="0">
-                    <a:solidFill>
-                      <a:schemeClr val="bg1"/>
-                    </a:solidFill>
-                  </a:rPr>
-                  <a:t>the board</a:t>
+                  <a:t>a solution is chosen in the list box, then it may be seen both on the chessboard and in a textbox</a:t>
                 </a:r>
               </a:p>
               <a:p>
@@ -11461,12 +11443,12 @@
             <p:spPr>
               <a:xfrm>
                 <a:off x="783831" y="1076857"/>
-                <a:ext cx="8064334" cy="3730701"/>
+                <a:ext cx="8064334" cy="3319691"/>
               </a:xfrm>
               <a:blipFill>
                 <a:blip r:embed="rId3"/>
                 <a:stretch>
-                  <a:fillRect l="-2194" t="-1307" b="-2124"/>
+                  <a:fillRect l="-2194" t="-1471" b="-3860"/>
                 </a:stretch>
               </a:blipFill>
             </p:spPr>
@@ -12457,7 +12439,7 @@
             </a:r>
             <a:r>
               <a:rPr lang="en-US" sz="2000" dirty="0"/>
-              <a:t> .NET, C# 7.0, WPF og MVVM</a:t>
+              <a:t> .NET 5.0, C# 8.0, WPF og MVVM</a:t>
             </a:r>
           </a:p>
           <a:p>
@@ -12475,7 +12457,7 @@
             </a:r>
             <a:r>
               <a:rPr lang="en-US" sz="2000" dirty="0"/>
-              <a:t> MS Visual Studio 2017, Community Version</a:t>
+              <a:t> MS Visual Studio 2019, Community Version</a:t>
             </a:r>
           </a:p>
           <a:p>

</xml_diff>

<commit_message>
Ignored Excel Documentation File from Git
</commit_message>
<xml_diff>
--- a/Documentation/NQueen Presentation.pptx
+++ b/Documentation/NQueen Presentation.pptx
@@ -234,7 +234,7 @@
           </a:lstStyle>
           <a:p>
             <a:fld id="{22356391-CFA0-1544-8425-9183CAE42ACA}" type="datetimeFigureOut">
-              <a:t>2/13/2021</a:t>
+              <a:t>2/14/2021</a:t>
             </a:fld>
             <a:endParaRPr lang="en-US" dirty="0"/>
           </a:p>
@@ -404,7 +404,7 @@
             <a:fld id="{DB01AB9E-8BFB-DA44-9869-DDFC164FA55D}" type="datetimeFigureOut">
               <a:rPr lang="en-US"/>
               <a:pPr/>
-              <a:t>2/13/2021</a:t>
+              <a:t>2/14/2021</a:t>
             </a:fld>
             <a:endParaRPr lang="en-US" dirty="0"/>
           </a:p>
@@ -6206,8 +6206,8 @@
           </a:p>
         </p:txBody>
       </p:sp>
-      <mc:AlternateContent xmlns:mc="http://schemas.openxmlformats.org/markup-compatibility/2006">
-        <mc:Choice xmlns:a14="http://schemas.microsoft.com/office/drawing/2010/main" Requires="a14">
+      <mc:AlternateContent xmlns:mc="http://schemas.openxmlformats.org/markup-compatibility/2006" xmlns:a14="http://schemas.microsoft.com/office/drawing/2010/main">
+        <mc:Choice Requires="a14">
           <p:sp>
             <p:nvSpPr>
               <p:cNvPr id="12" name="Subtitle 2">
@@ -6496,7 +6496,7 @@
             </p:txBody>
           </p:sp>
         </mc:Choice>
-        <mc:Fallback>
+        <mc:Fallback xmlns="">
           <p:sp>
             <p:nvSpPr>
               <p:cNvPr id="12" name="Subtitle 2">
@@ -9350,7 +9350,7 @@
         <p:spPr>
           <a:xfrm>
             <a:off x="1082524" y="1765656"/>
-            <a:ext cx="7445874" cy="2677656"/>
+            <a:ext cx="7445874" cy="2739211"/>
           </a:xfrm>
           <a:prstGeom prst="rect">
             <a:avLst/>
@@ -9504,8 +9504,15 @@
             </a:pPr>
             <a:r>
               <a:rPr lang="en-US" sz="2000" dirty="0"/>
-              <a:t>Place a queen in the next column, from the bottom and upward. If possible, continue to the next column, otherwise remove the last queen and try to place it further upward in the same column. If not possible, remove that one and go one column backward</a:t>
+              <a:t>Try to place a queen in a column from the bottom and upward. If possible, continue to the next column, otherwise remove the last queen and try to place it further upward in the same column </a:t>
             </a:r>
+          </a:p>
+          <a:p>
+            <a:pPr>
+              <a:buFont typeface="Wingdings" panose="05000000000000000000" pitchFamily="2" charset="2"/>
+              <a:buChar char="Ø"/>
+            </a:pPr>
+            <a:endParaRPr lang="en-US" sz="2000" dirty="0"/>
           </a:p>
           <a:p>
             <a:pPr>
@@ -9717,8 +9724,8 @@
           </a:p>
         </p:txBody>
       </p:sp>
-      <mc:AlternateContent xmlns:mc="http://schemas.openxmlformats.org/markup-compatibility/2006" xmlns:a14="http://schemas.microsoft.com/office/drawing/2010/main">
-        <mc:Choice Requires="a14">
+      <mc:AlternateContent xmlns:mc="http://schemas.openxmlformats.org/markup-compatibility/2006">
+        <mc:Choice xmlns:a14="http://schemas.microsoft.com/office/drawing/2010/main" Requires="a14">
           <p:sp>
             <p:nvSpPr>
               <p:cNvPr id="12" name="Subtitle 2">
@@ -9929,7 +9936,7 @@
               <a:p>
                 <a:pPr>
                   <a:buFont typeface="Wingdings" panose="05000000000000000000" pitchFamily="2" charset="2"/>
-                  <a:buChar char="ü"/>
+                  <a:buChar char="Ø"/>
                 </a:pPr>
                 <a:r>
                   <a:rPr lang="en-US" dirty="0"/>
@@ -9987,13 +9994,13 @@
                 </a:r>
                 <a:r>
                   <a:rPr lang="en-US" dirty="0"/>
-                  <a:t>if it is not equal to any other solution or their symm. counterparts</a:t>
+                  <a:t>if it is not equal to any other solution or their symm. Counterparts</a:t>
                 </a:r>
               </a:p>
             </p:txBody>
           </p:sp>
         </mc:Choice>
-        <mc:Fallback xmlns="">
+        <mc:Fallback>
           <p:sp>
             <p:nvSpPr>
               <p:cNvPr id="12" name="Subtitle 2">
@@ -10314,7 +10321,7 @@
             </a:pPr>
             <a:r>
               <a:rPr lang="en-US" dirty="0"/>
-              <a:t>are unique solutions and all their symm. Counterparts</a:t>
+              <a:t>are unique solutions and all their symm. counterparts</a:t>
             </a:r>
           </a:p>
           <a:p>
@@ -10347,7 +10354,7 @@
           <a:p>
             <a:pPr lvl="2">
               <a:buFont typeface="Wingdings" panose="05000000000000000000" pitchFamily="2" charset="2"/>
-              <a:buChar char="ü"/>
+              <a:buChar char="v"/>
             </a:pPr>
             <a:r>
               <a:rPr lang="en-US" dirty="0"/>
@@ -10357,7 +10364,7 @@
           <a:p>
             <a:pPr lvl="2">
               <a:buFont typeface="Wingdings" panose="05000000000000000000" pitchFamily="2" charset="2"/>
-              <a:buChar char="ü"/>
+              <a:buChar char="v"/>
             </a:pPr>
             <a:r>
               <a:rPr lang="en-US" dirty="0"/>
@@ -10367,7 +10374,7 @@
           <a:p>
             <a:pPr lvl="2">
               <a:buFont typeface="Wingdings" panose="05000000000000000000" pitchFamily="2" charset="2"/>
-              <a:buChar char="ü"/>
+              <a:buChar char="v"/>
             </a:pPr>
             <a:r>
               <a:rPr lang="en-US" dirty="0"/>

</xml_diff>